<commit_message>
Added Consolidated Results Spreadsheet
</commit_message>
<xml_diff>
--- a/ProjectDemo.pptx
+++ b/ProjectDemo.pptx
@@ -3749,13 +3749,19 @@
           <a:p>
             <a:r>
               <a:rPr lang="en-US" dirty="0"/>
-              <a:t>Therefore, problem of log analysis can greatly benefit </a:t>
+              <a:t>Studies in the past have presented as Hadoop MR as a POC for </a:t>
             </a:r>
             <a:r>
               <a:rPr lang="en-US"/>
-              <a:t>from column-based file formats.</a:t>
+              <a:t>log analysis.</a:t>
             </a:r>
             <a:endParaRPr lang="en-US" dirty="0"/>
+          </a:p>
+          <a:p>
+            <a:r>
+              <a:rPr lang="en-US" dirty="0"/>
+              <a:t>Therefore, problem of log analysis can greatly benefit from column-based file formats.</a:t>
+            </a:r>
           </a:p>
           <a:p>
             <a:pPr marL="0" indent="0">

</xml_diff>